<commit_message>
Updated labs and instructions
</commit_message>
<xml_diff>
--- a/lesson-react-20-ajax/react-ajax.pptx
+++ b/lesson-react-20-ajax/react-ajax.pptx
@@ -18,8 +18,8 @@
     <p:sldId id="374" r:id="rId6"/>
     <p:sldId id="375" r:id="rId7"/>
     <p:sldId id="376" r:id="rId8"/>
-    <p:sldId id="377" r:id="rId9"/>
-    <p:sldId id="384" r:id="rId10"/>
+    <p:sldId id="387" r:id="rId9"/>
+    <p:sldId id="388" r:id="rId10"/>
     <p:sldId id="381" r:id="rId11"/>
     <p:sldId id="382" r:id="rId12"/>
     <p:sldId id="383" r:id="rId13"/>
@@ -10571,7 +10571,11 @@
             </a:pPr>
             <a:r>
               <a:rPr lang="en-US" dirty="0" smtClean="0"/>
-              <a:t>It works</a:t>
+              <a:t>Watch i</a:t>
+            </a:r>
+            <a:r>
+              <a:rPr lang="en-US" dirty="0" smtClean="0"/>
+              <a:t>t work</a:t>
             </a:r>
             <a:r>
               <a:rPr lang="is-IS" dirty="0" smtClean="0"/>
@@ -10842,13 +10846,8 @@
             </a:pPr>
             <a:r>
               <a:rPr lang="en-US" dirty="0" smtClean="0"/>
-              <a:t>Use existing </a:t>
-            </a:r>
-            <a:r>
-              <a:rPr lang="en-US" dirty="0" smtClean="0"/>
-              <a:t>Express RESTful app</a:t>
-            </a:r>
-            <a:endParaRPr lang="en-US" dirty="0" smtClean="0"/>
+              <a:t>Use existing Express RESTful app</a:t>
+            </a:r>
           </a:p>
           <a:p>
             <a:pPr marL="342900" indent="-342900">
@@ -10881,15 +10880,7 @@
                   <a:srgbClr val="FF0000"/>
                 </a:solidFill>
               </a:rPr>
-              <a:t>/components</a:t>
-            </a:r>
-            <a:r>
-              <a:rPr lang="en-US" dirty="0" smtClean="0">
-                <a:solidFill>
-                  <a:srgbClr val="FF0000"/>
-                </a:solidFill>
-              </a:rPr>
-              <a:t>/</a:t>
+              <a:t>/components/</a:t>
             </a:r>
             <a:r>
               <a:rPr lang="en-US" dirty="0" err="1" smtClean="0">
@@ -10919,11 +10910,7 @@
             </a:pPr>
             <a:r>
               <a:rPr lang="en-US" dirty="0" smtClean="0"/>
-              <a:t>Instead of in-memory </a:t>
-            </a:r>
-            <a:r>
-              <a:rPr lang="en-US" dirty="0" smtClean="0"/>
-              <a:t>model</a:t>
+              <a:t>Instead of in-memory model</a:t>
             </a:r>
           </a:p>
           <a:p>
@@ -12306,7 +12293,15 @@
             </a:pPr>
             <a:r>
               <a:rPr lang="en-US" dirty="0" smtClean="0"/>
-              <a:t>Can’t run on the server</a:t>
+              <a:t>Client Side Frameworks c</a:t>
+            </a:r>
+            <a:r>
+              <a:rPr lang="en-US" dirty="0" smtClean="0"/>
+              <a:t>an’t </a:t>
+            </a:r>
+            <a:r>
+              <a:rPr lang="en-US" dirty="0" smtClean="0"/>
+              <a:t>run on the server</a:t>
             </a:r>
           </a:p>
           <a:p>
@@ -12376,8 +12371,33 @@
             </a:pPr>
             <a:r>
               <a:rPr lang="en-US" dirty="0" smtClean="0"/>
-              <a:t>Errors encountered</a:t>
-            </a:r>
+              <a:t>Errors </a:t>
+            </a:r>
+            <a:r>
+              <a:rPr lang="en-US" dirty="0" smtClean="0"/>
+              <a:t>encountered </a:t>
+            </a:r>
+            <a:r>
+              <a:rPr lang="mr-IN" dirty="0" smtClean="0"/>
+              <a:t>–</a:t>
+            </a:r>
+            <a:r>
+              <a:rPr lang="en-US" dirty="0" smtClean="0"/>
+              <a:t> e.g. </a:t>
+            </a:r>
+            <a:r>
+              <a:rPr lang="en-US" dirty="0" smtClean="0">
+                <a:solidFill>
+                  <a:srgbClr val="FF0000"/>
+                </a:solidFill>
+              </a:rPr>
+              <a:t>window</a:t>
+            </a:r>
+            <a:r>
+              <a:rPr lang="en-US" dirty="0" smtClean="0"/>
+              <a:t> object doesn’t exist on server</a:t>
+            </a:r>
+            <a:endParaRPr lang="en-US" dirty="0" smtClean="0"/>
           </a:p>
           <a:p>
             <a:pPr marL="342900" indent="-342900">
@@ -12548,7 +12568,15 @@
             </a:pPr>
             <a:r>
               <a:rPr lang="en-US" dirty="0" smtClean="0"/>
-              <a:t>Promises – update the state on the then()</a:t>
+              <a:t>Promises – update the state on the </a:t>
+            </a:r>
+            <a:r>
+              <a:rPr lang="en-US" dirty="0" smtClean="0">
+                <a:solidFill>
+                  <a:srgbClr val="FF0000"/>
+                </a:solidFill>
+              </a:rPr>
+              <a:t>then()</a:t>
             </a:r>
           </a:p>
           <a:p>
@@ -12562,7 +12590,11 @@
             </a:r>
             <a:r>
               <a:rPr lang="en-US" dirty="0" smtClean="0"/>
-              <a:t> – update the state at the end</a:t>
+              <a:t> module </a:t>
+            </a:r>
+            <a:r>
+              <a:rPr lang="en-US" dirty="0" smtClean="0"/>
+              <a:t>– update the state at the end</a:t>
             </a:r>
           </a:p>
           <a:p>
@@ -13635,62 +13667,24 @@
             </a:r>
           </a:p>
           <a:p>
-            <a:pPr marL="285750" indent="-285750">
-              <a:buFont typeface="Arial" charset="0"/>
-              <a:buChar char="•"/>
-            </a:pPr>
-            <a:r>
-              <a:rPr lang="en-US" sz="1600" b="1" dirty="0" smtClean="0">
-                <a:solidFill>
-                  <a:srgbClr val="000080"/>
-                </a:solidFill>
-              </a:rPr>
-              <a:t>Notice the </a:t>
-            </a:r>
-            <a:r>
-              <a:rPr lang="en-US" sz="1600" b="1" dirty="0" smtClean="0">
-                <a:solidFill>
-                  <a:srgbClr val="C00000"/>
-                </a:solidFill>
-              </a:rPr>
-              <a:t>_</a:t>
-            </a:r>
-            <a:r>
-              <a:rPr lang="en-US" sz="1600" b="1" dirty="0" err="1" smtClean="0">
-                <a:solidFill>
-                  <a:srgbClr val="C00000"/>
-                </a:solidFill>
-              </a:rPr>
-              <a:t>csrf</a:t>
-            </a:r>
-            <a:r>
-              <a:rPr lang="en-US" sz="1600" b="1" dirty="0" smtClean="0">
-                <a:solidFill>
-                  <a:srgbClr val="C00000"/>
-                </a:solidFill>
-              </a:rPr>
-              <a:t> </a:t>
-            </a:r>
-            <a:r>
-              <a:rPr lang="en-US" sz="1600" b="1" dirty="0" smtClean="0">
-                <a:solidFill>
-                  <a:srgbClr val="000080"/>
-                </a:solidFill>
-              </a:rPr>
-              <a:t>property</a:t>
-            </a:r>
-          </a:p>
-          <a:p>
             <a:pPr marL="288925" lvl="1" indent="0">
               <a:buNone/>
             </a:pPr>
             <a:r>
+              <a:rPr lang="en-US" sz="1200" b="1" dirty="0" smtClean="0">
+                <a:solidFill>
+                  <a:srgbClr val="008000"/>
+                </a:solidFill>
+              </a:rPr>
+              <a:t>'use </a:t>
+            </a:r>
+            <a:r>
               <a:rPr lang="en-US" sz="1200" b="1" dirty="0">
                 <a:solidFill>
                   <a:srgbClr val="008000"/>
                 </a:solidFill>
               </a:rPr>
-              <a:t>'use strict'</a:t>
+              <a:t>strict'</a:t>
             </a:r>
             <a:r>
               <a:rPr lang="en-US" sz="1200" dirty="0"/>
@@ -13881,11 +13875,23 @@
                   <a:srgbClr val="008000"/>
                 </a:solidFill>
               </a:rPr>
-              <a:t>'First'</a:t>
+              <a:t>'First</a:t>
+            </a:r>
+            <a:r>
+              <a:rPr lang="en-US" sz="1200" b="1" dirty="0" smtClean="0">
+                <a:solidFill>
+                  <a:srgbClr val="008000"/>
+                </a:solidFill>
+              </a:rPr>
+              <a:t>'</a:t>
+            </a:r>
+            <a:r>
+              <a:rPr lang="en-US" sz="1200" dirty="0" smtClean="0"/>
+              <a:t>}]</a:t>
             </a:r>
             <a:r>
               <a:rPr lang="en-US" sz="1200" dirty="0"/>
-              <a:t>}],</a:t>
+              <a:t/>
             </a:r>
             <a:br>
               <a:rPr lang="en-US" sz="1200" dirty="0"/>
@@ -13897,30 +13903,10 @@
             <a:r>
               <a:rPr lang="en-US" sz="1200" b="1" dirty="0">
                 <a:solidFill>
-                  <a:srgbClr val="660E7A"/>
-                </a:solidFill>
-              </a:rPr>
-              <a:t>_</a:t>
-            </a:r>
-            <a:r>
-              <a:rPr lang="en-US" sz="1200" b="1" dirty="0" err="1">
-                <a:solidFill>
-                  <a:srgbClr val="660E7A"/>
-                </a:solidFill>
-              </a:rPr>
-              <a:t>csrf</a:t>
-            </a:r>
-            <a:r>
-              <a:rPr lang="en-US" sz="1200" dirty="0"/>
-              <a:t>: </a:t>
-            </a:r>
-            <a:r>
-              <a:rPr lang="en-US" sz="1200" b="1" dirty="0">
-                <a:solidFill>
                   <a:srgbClr val="008000"/>
                 </a:solidFill>
               </a:rPr>
-              <a:t>''</a:t>
+              <a:t/>
             </a:r>
             <a:br>
               <a:rPr lang="en-US" sz="1200" b="1" dirty="0">
@@ -13985,7 +13971,7 @@
     </p:spTree>
     <p:extLst>
       <p:ext uri="{BB962C8B-B14F-4D97-AF65-F5344CB8AC3E}">
-        <p14:creationId xmlns:p14="http://schemas.microsoft.com/office/powerpoint/2010/main" val="678720772"/>
+        <p14:creationId xmlns:p14="http://schemas.microsoft.com/office/powerpoint/2010/main" val="666373341"/>
       </p:ext>
     </p:extLst>
   </p:cSld>
@@ -14194,109 +14180,93 @@
               <a:rPr lang="en-US" sz="1600" dirty="0"/>
             </a:br>
             <a:r>
-              <a:rPr lang="en-US" sz="1600" b="1" dirty="0" err="1">
-                <a:solidFill>
-                  <a:srgbClr val="000080"/>
-                </a:solidFill>
-              </a:rPr>
-              <a:t>var</a:t>
-            </a:r>
-            <a:r>
-              <a:rPr lang="en-US" sz="1600" b="1" dirty="0">
-                <a:solidFill>
-                  <a:srgbClr val="000080"/>
-                </a:solidFill>
-              </a:rPr>
-              <a:t> </a:t>
-            </a:r>
-            <a:r>
-              <a:rPr lang="en-US" sz="1600" b="1" i="1" dirty="0">
-                <a:solidFill>
-                  <a:srgbClr val="660E7A"/>
-                </a:solidFill>
-              </a:rPr>
-              <a:t>_</a:t>
-            </a:r>
-            <a:r>
-              <a:rPr lang="en-US" sz="1600" b="1" i="1" dirty="0" err="1">
-                <a:solidFill>
-                  <a:srgbClr val="660E7A"/>
-                </a:solidFill>
-              </a:rPr>
-              <a:t>csrf</a:t>
-            </a:r>
-            <a:r>
-              <a:rPr lang="en-US" sz="1600" b="1" i="1" dirty="0">
-                <a:solidFill>
-                  <a:srgbClr val="660E7A"/>
-                </a:solidFill>
-              </a:rPr>
-              <a:t> </a:t>
-            </a:r>
-            <a:r>
               <a:rPr lang="en-US" sz="1600" dirty="0"/>
-              <a:t>= </a:t>
-            </a:r>
-            <a:r>
-              <a:rPr lang="en-US" sz="1600" b="1" dirty="0">
-                <a:solidFill>
-                  <a:srgbClr val="008000"/>
-                </a:solidFill>
-              </a:rPr>
-              <a:t>''</a:t>
-            </a:r>
-            <a:r>
-              <a:rPr lang="en-US" sz="1600" dirty="0"/>
-              <a:t>;</a:t>
+              <a:t/>
             </a:r>
             <a:br>
               <a:rPr lang="en-US" sz="1600" dirty="0"/>
             </a:br>
             <a:r>
+              <a:rPr lang="en-US" sz="1600" b="1" dirty="0" err="1">
+                <a:solidFill>
+                  <a:srgbClr val="660E7A"/>
+                </a:solidFill>
+              </a:rPr>
+              <a:t>module</a:t>
+            </a:r>
+            <a:r>
+              <a:rPr lang="en-US" sz="1600" dirty="0" err="1"/>
+              <a:t>.</a:t>
+            </a:r>
+            <a:r>
+              <a:rPr lang="en-US" sz="1600" dirty="0" err="1">
+                <a:solidFill>
+                  <a:srgbClr val="7A7A43"/>
+                </a:solidFill>
+              </a:rPr>
+              <a:t>exports</a:t>
+            </a:r>
+            <a:r>
+              <a:rPr lang="en-US" sz="1600" dirty="0">
+                <a:solidFill>
+                  <a:srgbClr val="7A7A43"/>
+                </a:solidFill>
+              </a:rPr>
+              <a:t> </a:t>
+            </a:r>
+            <a:r>
               <a:rPr lang="en-US" sz="1600" dirty="0"/>
-              <a:t/>
+              <a:t>= {</a:t>
             </a:r>
             <a:br>
               <a:rPr lang="en-US" sz="1600" dirty="0"/>
             </a:br>
             <a:r>
-              <a:rPr lang="en-US" sz="1600" b="1" dirty="0" err="1">
-                <a:solidFill>
-                  <a:srgbClr val="660E7A"/>
-                </a:solidFill>
-              </a:rPr>
-              <a:t>module</a:t>
-            </a:r>
-            <a:r>
-              <a:rPr lang="en-US" sz="1600" dirty="0" err="1"/>
-              <a:t>.</a:t>
-            </a:r>
-            <a:r>
-              <a:rPr lang="en-US" sz="1600" dirty="0" err="1">
+              <a:rPr lang="en-US" sz="1600" dirty="0"/>
+              <a:t>    </a:t>
+            </a:r>
+            <a:r>
+              <a:rPr lang="en-US" sz="1600" dirty="0">
                 <a:solidFill>
                   <a:srgbClr val="7A7A43"/>
                 </a:solidFill>
               </a:rPr>
-              <a:t>exports</a:t>
-            </a:r>
-            <a:r>
-              <a:rPr lang="en-US" sz="1600" dirty="0">
-                <a:solidFill>
-                  <a:srgbClr val="7A7A43"/>
-                </a:solidFill>
-              </a:rPr>
-              <a:t> </a:t>
+              <a:t>create</a:t>
             </a:r>
             <a:r>
               <a:rPr lang="en-US" sz="1600" dirty="0"/>
-              <a:t>= {</a:t>
+              <a:t>: </a:t>
+            </a:r>
+            <a:r>
+              <a:rPr lang="en-US" sz="1600" b="1" dirty="0">
+                <a:solidFill>
+                  <a:srgbClr val="000080"/>
+                </a:solidFill>
+              </a:rPr>
+              <a:t>function </a:t>
+            </a:r>
+            <a:r>
+              <a:rPr lang="en-US" sz="1600" dirty="0"/>
+              <a:t>(content, callback) {</a:t>
             </a:r>
             <a:br>
               <a:rPr lang="en-US" sz="1600" dirty="0"/>
             </a:br>
             <a:r>
               <a:rPr lang="en-US" sz="1600" dirty="0"/>
-              <a:t>    </a:t>
+              <a:t>        </a:t>
+            </a:r>
+            <a:r>
+              <a:rPr lang="en-US" sz="1600" b="1" i="1" dirty="0">
+                <a:solidFill>
+                  <a:srgbClr val="660E7A"/>
+                </a:solidFill>
+              </a:rPr>
+              <a:t>$</a:t>
+            </a:r>
+            <a:r>
+              <a:rPr lang="en-US" sz="1600" dirty="0"/>
+              <a:t>.</a:t>
             </a:r>
             <a:r>
               <a:rPr lang="en-US" sz="1600" dirty="0">
@@ -14304,450 +14274,313 @@
                   <a:srgbClr val="7A7A43"/>
                 </a:solidFill>
               </a:rPr>
-              <a:t>create</a:t>
+              <a:t>post</a:t>
+            </a:r>
+            <a:r>
+              <a:rPr lang="en-US" sz="1600" dirty="0"/>
+              <a:t>(</a:t>
+            </a:r>
+            <a:r>
+              <a:rPr lang="en-US" sz="1600" b="1" dirty="0">
+                <a:solidFill>
+                  <a:srgbClr val="008000"/>
+                </a:solidFill>
+              </a:rPr>
+              <a:t>'/</a:t>
+            </a:r>
+            <a:r>
+              <a:rPr lang="en-US" sz="1600" b="1" dirty="0" err="1">
+                <a:solidFill>
+                  <a:srgbClr val="008000"/>
+                </a:solidFill>
+              </a:rPr>
+              <a:t>api</a:t>
+            </a:r>
+            <a:r>
+              <a:rPr lang="en-US" sz="1600" b="1" dirty="0">
+                <a:solidFill>
+                  <a:srgbClr val="008000"/>
+                </a:solidFill>
+              </a:rPr>
+              <a:t>/</a:t>
+            </a:r>
+            <a:r>
+              <a:rPr lang="en-US" sz="1600" b="1" dirty="0" err="1">
+                <a:solidFill>
+                  <a:srgbClr val="008000"/>
+                </a:solidFill>
+              </a:rPr>
+              <a:t>todos</a:t>
+            </a:r>
+            <a:r>
+              <a:rPr lang="en-US" sz="1600" b="1" dirty="0">
+                <a:solidFill>
+                  <a:srgbClr val="008000"/>
+                </a:solidFill>
+              </a:rPr>
+              <a:t>'</a:t>
+            </a:r>
+            <a:r>
+              <a:rPr lang="en-US" sz="1600" dirty="0"/>
+              <a:t>,{ </a:t>
+            </a:r>
+            <a:r>
+              <a:rPr lang="en-US" sz="1600" b="1" dirty="0">
+                <a:solidFill>
+                  <a:srgbClr val="660E7A"/>
+                </a:solidFill>
+              </a:rPr>
+              <a:t>content</a:t>
+            </a:r>
+            <a:r>
+              <a:rPr lang="en-US" sz="1600" dirty="0"/>
+              <a:t>: content, </a:t>
+            </a:r>
+            <a:r>
+              <a:rPr lang="en-US" sz="1600" b="1" dirty="0">
+                <a:solidFill>
+                  <a:srgbClr val="660E7A"/>
+                </a:solidFill>
+              </a:rPr>
+              <a:t>_</a:t>
+            </a:r>
+            <a:r>
+              <a:rPr lang="en-US" sz="1600" b="1" dirty="0" err="1">
+                <a:solidFill>
+                  <a:srgbClr val="660E7A"/>
+                </a:solidFill>
+              </a:rPr>
+              <a:t>csrf</a:t>
             </a:r>
             <a:r>
               <a:rPr lang="en-US" sz="1600" dirty="0"/>
               <a:t>: </a:t>
             </a:r>
             <a:r>
+              <a:rPr lang="en-US" sz="1600" b="1" i="1" dirty="0">
+                <a:solidFill>
+                  <a:srgbClr val="660E7A"/>
+                </a:solidFill>
+              </a:rPr>
+              <a:t>_</a:t>
+            </a:r>
+            <a:r>
+              <a:rPr lang="en-US" sz="1600" b="1" i="1" dirty="0" err="1">
+                <a:solidFill>
+                  <a:srgbClr val="660E7A"/>
+                </a:solidFill>
+              </a:rPr>
+              <a:t>csrf</a:t>
+            </a:r>
+            <a:r>
+              <a:rPr lang="en-US" sz="1600" b="1" i="1" dirty="0">
+                <a:solidFill>
+                  <a:srgbClr val="660E7A"/>
+                </a:solidFill>
+              </a:rPr>
+              <a:t> </a:t>
+            </a:r>
+            <a:r>
+              <a:rPr lang="en-US" sz="1600" dirty="0"/>
+              <a:t>}, </a:t>
+            </a:r>
+            <a:r>
               <a:rPr lang="en-US" sz="1600" b="1" dirty="0">
                 <a:solidFill>
                   <a:srgbClr val="000080"/>
                 </a:solidFill>
               </a:rPr>
-              <a:t>function </a:t>
+              <a:t>function</a:t>
             </a:r>
             <a:r>
               <a:rPr lang="en-US" sz="1600" dirty="0"/>
-              <a:t>(content, callback) {</a:t>
+              <a:t>( model ) {</a:t>
             </a:r>
             <a:br>
               <a:rPr lang="en-US" sz="1600" dirty="0"/>
             </a:br>
             <a:r>
               <a:rPr lang="en-US" sz="1600" dirty="0"/>
-              <a:t>        </a:t>
-            </a:r>
-            <a:r>
-              <a:rPr lang="en-US" sz="1600" b="1" i="1" dirty="0">
+              <a:t> </a:t>
+            </a:r>
+            <a:r>
+              <a:rPr lang="en-US" sz="1600" dirty="0" smtClean="0"/>
+              <a:t>	callback</a:t>
+            </a:r>
+            <a:r>
+              <a:rPr lang="en-US" sz="1600" dirty="0"/>
+              <a:t>( </a:t>
+            </a:r>
+            <a:r>
+              <a:rPr lang="en-US" sz="1600" dirty="0" err="1"/>
+              <a:t>model.</a:t>
+            </a:r>
+            <a:r>
+              <a:rPr lang="en-US" sz="1600" b="1" dirty="0" err="1">
                 <a:solidFill>
                   <a:srgbClr val="660E7A"/>
                 </a:solidFill>
               </a:rPr>
-              <a:t>$</a:t>
+              <a:t>todos</a:t>
+            </a:r>
+            <a:r>
+              <a:rPr lang="en-US" sz="1600" b="1" dirty="0">
+                <a:solidFill>
+                  <a:srgbClr val="660E7A"/>
+                </a:solidFill>
+              </a:rPr>
+              <a:t> </a:t>
             </a:r>
             <a:r>
               <a:rPr lang="en-US" sz="1600" dirty="0"/>
-              <a:t>.</a:t>
-            </a:r>
-            <a:r>
-              <a:rPr lang="en-US" sz="1600" dirty="0">
-                <a:solidFill>
-                  <a:srgbClr val="7A7A43"/>
-                </a:solidFill>
-              </a:rPr>
-              <a:t>post</a:t>
-            </a:r>
-            <a:r>
-              <a:rPr lang="en-US" sz="1600" dirty="0"/>
-              <a:t>(</a:t>
-            </a:r>
-            <a:r>
-              <a:rPr lang="en-US" sz="1600" b="1" dirty="0">
-                <a:solidFill>
-                  <a:srgbClr val="008000"/>
-                </a:solidFill>
-              </a:rPr>
-              <a:t>'/</a:t>
-            </a:r>
-            <a:r>
-              <a:rPr lang="en-US" sz="1600" b="1" dirty="0" err="1">
-                <a:solidFill>
-                  <a:srgbClr val="008000"/>
-                </a:solidFill>
-              </a:rPr>
-              <a:t>api</a:t>
-            </a:r>
-            <a:r>
-              <a:rPr lang="en-US" sz="1600" b="1" dirty="0">
-                <a:solidFill>
-                  <a:srgbClr val="008000"/>
-                </a:solidFill>
-              </a:rPr>
-              <a:t>/</a:t>
-            </a:r>
-            <a:r>
-              <a:rPr lang="en-US" sz="1600" b="1" dirty="0" err="1">
-                <a:solidFill>
-                  <a:srgbClr val="008000"/>
-                </a:solidFill>
-              </a:rPr>
-              <a:t>todos</a:t>
-            </a:r>
-            <a:r>
-              <a:rPr lang="en-US" sz="1600" b="1" dirty="0">
-                <a:solidFill>
-                  <a:srgbClr val="008000"/>
-                </a:solidFill>
-              </a:rPr>
-              <a:t>'</a:t>
-            </a:r>
-            <a:r>
-              <a:rPr lang="en-US" sz="1600" dirty="0"/>
-              <a:t>,{ </a:t>
-            </a:r>
-            <a:r>
-              <a:rPr lang="en-US" sz="1600" b="1" dirty="0">
-                <a:solidFill>
-                  <a:srgbClr val="660E7A"/>
-                </a:solidFill>
-              </a:rPr>
-              <a:t>content</a:t>
-            </a:r>
-            <a:r>
-              <a:rPr lang="en-US" sz="1600" dirty="0"/>
-              <a:t>: content, </a:t>
-            </a:r>
-            <a:r>
-              <a:rPr lang="en-US" sz="1600" b="1" dirty="0">
-                <a:solidFill>
-                  <a:srgbClr val="660E7A"/>
-                </a:solidFill>
-              </a:rPr>
-              <a:t>_</a:t>
-            </a:r>
-            <a:r>
-              <a:rPr lang="en-US" sz="1600" b="1" dirty="0" err="1">
-                <a:solidFill>
-                  <a:srgbClr val="660E7A"/>
-                </a:solidFill>
-              </a:rPr>
-              <a:t>csrf</a:t>
-            </a:r>
-            <a:r>
-              <a:rPr lang="en-US" sz="1600" dirty="0"/>
-              <a:t>: </a:t>
-            </a:r>
-            <a:r>
-              <a:rPr lang="en-US" sz="1600" b="1" i="1" dirty="0">
-                <a:solidFill>
-                  <a:srgbClr val="660E7A"/>
-                </a:solidFill>
-              </a:rPr>
-              <a:t>_</a:t>
-            </a:r>
-            <a:r>
-              <a:rPr lang="en-US" sz="1600" b="1" i="1" dirty="0" err="1">
-                <a:solidFill>
-                  <a:srgbClr val="660E7A"/>
-                </a:solidFill>
-              </a:rPr>
-              <a:t>csrf</a:t>
-            </a:r>
-            <a:r>
-              <a:rPr lang="en-US" sz="1600" b="1" i="1" dirty="0">
-                <a:solidFill>
-                  <a:srgbClr val="660E7A"/>
-                </a:solidFill>
-              </a:rPr>
-              <a:t> </a:t>
-            </a:r>
-            <a:r>
-              <a:rPr lang="en-US" sz="1600" dirty="0"/>
-              <a:t>}, </a:t>
-            </a:r>
-            <a:r>
-              <a:rPr lang="en-US" sz="1600" b="1" dirty="0">
-                <a:solidFill>
-                  <a:srgbClr val="000080"/>
-                </a:solidFill>
-              </a:rPr>
-              <a:t>function</a:t>
-            </a:r>
-            <a:r>
-              <a:rPr lang="en-US" sz="1600" dirty="0"/>
-              <a:t>( model ) {</a:t>
+              <a:t>);</a:t>
             </a:r>
             <a:br>
               <a:rPr lang="en-US" sz="1600" dirty="0"/>
             </a:br>
             <a:r>
               <a:rPr lang="en-US" sz="1600" dirty="0"/>
-              <a:t>            </a:t>
-            </a:r>
-            <a:r>
-              <a:rPr lang="en-US" sz="1600" b="1" i="1" dirty="0">
-                <a:solidFill>
-                  <a:srgbClr val="660E7A"/>
-                </a:solidFill>
-              </a:rPr>
-              <a:t>_</a:t>
-            </a:r>
-            <a:r>
-              <a:rPr lang="en-US" sz="1600" b="1" i="1" dirty="0" err="1">
-                <a:solidFill>
-                  <a:srgbClr val="660E7A"/>
-                </a:solidFill>
-              </a:rPr>
-              <a:t>csrf</a:t>
-            </a:r>
-            <a:r>
-              <a:rPr lang="en-US" sz="1600" b="1" i="1" dirty="0">
-                <a:solidFill>
-                  <a:srgbClr val="660E7A"/>
-                </a:solidFill>
-              </a:rPr>
-              <a:t> </a:t>
-            </a:r>
-            <a:r>
-              <a:rPr lang="en-US" sz="1600" dirty="0"/>
-              <a:t>= model.</a:t>
-            </a:r>
-            <a:r>
-              <a:rPr lang="en-US" sz="1600" b="1" dirty="0">
-                <a:solidFill>
-                  <a:srgbClr val="660E7A"/>
-                </a:solidFill>
-              </a:rPr>
-              <a:t>_</a:t>
-            </a:r>
-            <a:r>
-              <a:rPr lang="en-US" sz="1600" b="1" dirty="0" err="1">
-                <a:solidFill>
-                  <a:srgbClr val="660E7A"/>
-                </a:solidFill>
-              </a:rPr>
-              <a:t>csrf</a:t>
-            </a:r>
-            <a:r>
-              <a:rPr lang="en-US" sz="1600" dirty="0"/>
-              <a:t>;</a:t>
+              <a:t>        });</a:t>
             </a:r>
             <a:br>
               <a:rPr lang="en-US" sz="1600" dirty="0"/>
             </a:br>
             <a:r>
               <a:rPr lang="en-US" sz="1600" dirty="0"/>
-              <a:t>            callback( </a:t>
-            </a:r>
-            <a:r>
-              <a:rPr lang="en-US" sz="1600" dirty="0" err="1"/>
-              <a:t>model.</a:t>
-            </a:r>
-            <a:r>
-              <a:rPr lang="en-US" sz="1600" b="1" dirty="0" err="1">
-                <a:solidFill>
-                  <a:srgbClr val="660E7A"/>
-                </a:solidFill>
-              </a:rPr>
-              <a:t>todos</a:t>
-            </a:r>
-            <a:r>
-              <a:rPr lang="en-US" sz="1600" b="1" dirty="0">
-                <a:solidFill>
-                  <a:srgbClr val="660E7A"/>
-                </a:solidFill>
-              </a:rPr>
-              <a:t> </a:t>
-            </a:r>
-            <a:r>
-              <a:rPr lang="en-US" sz="1600" dirty="0"/>
-              <a:t>);</a:t>
+              <a:t>    },</a:t>
             </a:r>
             <a:br>
               <a:rPr lang="en-US" sz="1600" dirty="0"/>
             </a:br>
             <a:r>
               <a:rPr lang="en-US" sz="1600" dirty="0"/>
-              <a:t>        });</a:t>
+              <a:t>    </a:t>
+            </a:r>
+            <a:r>
+              <a:rPr lang="en-US" sz="1600" dirty="0" err="1">
+                <a:solidFill>
+                  <a:srgbClr val="7A7A43"/>
+                </a:solidFill>
+              </a:rPr>
+              <a:t>findAll</a:t>
+            </a:r>
+            <a:r>
+              <a:rPr lang="en-US" sz="1600" dirty="0"/>
+              <a:t>: </a:t>
+            </a:r>
+            <a:r>
+              <a:rPr lang="en-US" sz="1600" b="1" dirty="0">
+                <a:solidFill>
+                  <a:srgbClr val="000080"/>
+                </a:solidFill>
+              </a:rPr>
+              <a:t>function </a:t>
+            </a:r>
+            <a:r>
+              <a:rPr lang="en-US" sz="1600" dirty="0"/>
+              <a:t>( callback ) {</a:t>
             </a:r>
             <a:br>
               <a:rPr lang="en-US" sz="1600" dirty="0"/>
             </a:br>
             <a:r>
               <a:rPr lang="en-US" sz="1600" dirty="0"/>
-              <a:t>    },</a:t>
+              <a:t>        </a:t>
+            </a:r>
+            <a:r>
+              <a:rPr lang="en-US" sz="1600" b="1" i="1" dirty="0">
+                <a:solidFill>
+                  <a:srgbClr val="660E7A"/>
+                </a:solidFill>
+              </a:rPr>
+              <a:t>$</a:t>
+            </a:r>
+            <a:r>
+              <a:rPr lang="en-US" sz="1600" dirty="0"/>
+              <a:t>.</a:t>
+            </a:r>
+            <a:r>
+              <a:rPr lang="en-US" sz="1600" dirty="0">
+                <a:solidFill>
+                  <a:srgbClr val="7A7A43"/>
+                </a:solidFill>
+              </a:rPr>
+              <a:t>get</a:t>
+            </a:r>
+            <a:r>
+              <a:rPr lang="en-US" sz="1600" dirty="0"/>
+              <a:t>( </a:t>
+            </a:r>
+            <a:r>
+              <a:rPr lang="en-US" sz="1600" b="1" dirty="0">
+                <a:solidFill>
+                  <a:srgbClr val="008000"/>
+                </a:solidFill>
+              </a:rPr>
+              <a:t>'/</a:t>
+            </a:r>
+            <a:r>
+              <a:rPr lang="en-US" sz="1600" b="1" dirty="0" err="1">
+                <a:solidFill>
+                  <a:srgbClr val="008000"/>
+                </a:solidFill>
+              </a:rPr>
+              <a:t>api</a:t>
+            </a:r>
+            <a:r>
+              <a:rPr lang="en-US" sz="1600" b="1" dirty="0">
+                <a:solidFill>
+                  <a:srgbClr val="008000"/>
+                </a:solidFill>
+              </a:rPr>
+              <a:t>/</a:t>
+            </a:r>
+            <a:r>
+              <a:rPr lang="en-US" sz="1600" b="1" dirty="0" err="1">
+                <a:solidFill>
+                  <a:srgbClr val="008000"/>
+                </a:solidFill>
+              </a:rPr>
+              <a:t>todos</a:t>
+            </a:r>
+            <a:r>
+              <a:rPr lang="en-US" sz="1600" b="1" dirty="0">
+                <a:solidFill>
+                  <a:srgbClr val="008000"/>
+                </a:solidFill>
+              </a:rPr>
+              <a:t>'</a:t>
+            </a:r>
+            <a:r>
+              <a:rPr lang="en-US" sz="1600" dirty="0"/>
+              <a:t>, </a:t>
+            </a:r>
+            <a:r>
+              <a:rPr lang="en-US" sz="1600" b="1" dirty="0">
+                <a:solidFill>
+                  <a:srgbClr val="000080"/>
+                </a:solidFill>
+              </a:rPr>
+              <a:t>function</a:t>
+            </a:r>
+            <a:r>
+              <a:rPr lang="en-US" sz="1600" dirty="0"/>
+              <a:t>( model ) {</a:t>
             </a:r>
             <a:br>
               <a:rPr lang="en-US" sz="1600" dirty="0"/>
             </a:br>
             <a:r>
               <a:rPr lang="en-US" sz="1600" dirty="0"/>
-              <a:t>    </a:t>
-            </a:r>
-            <a:r>
-              <a:rPr lang="en-US" sz="1600" dirty="0" err="1">
-                <a:solidFill>
-                  <a:srgbClr val="7A7A43"/>
-                </a:solidFill>
-              </a:rPr>
-              <a:t>findAll</a:t>
-            </a:r>
-            <a:r>
-              <a:rPr lang="en-US" sz="1600" dirty="0"/>
-              <a:t>: </a:t>
-            </a:r>
-            <a:r>
-              <a:rPr lang="en-US" sz="1600" b="1" dirty="0">
-                <a:solidFill>
-                  <a:srgbClr val="000080"/>
-                </a:solidFill>
-              </a:rPr>
-              <a:t>function </a:t>
-            </a:r>
-            <a:r>
-              <a:rPr lang="en-US" sz="1600" dirty="0"/>
-              <a:t>( callback ) {</a:t>
-            </a:r>
-            <a:br>
-              <a:rPr lang="en-US" sz="1600" dirty="0"/>
-            </a:br>
-            <a:r>
-              <a:rPr lang="en-US" sz="1600" dirty="0"/>
-              <a:t>        </a:t>
-            </a:r>
-            <a:r>
-              <a:rPr lang="en-US" sz="1600" b="1" i="1" dirty="0">
-                <a:solidFill>
-                  <a:srgbClr val="660E7A"/>
-                </a:solidFill>
-              </a:rPr>
-              <a:t>$</a:t>
-            </a:r>
-            <a:r>
-              <a:rPr lang="en-US" sz="1600" dirty="0"/>
-              <a:t>.</a:t>
-            </a:r>
-            <a:r>
-              <a:rPr lang="en-US" sz="1600" dirty="0">
-                <a:solidFill>
-                  <a:srgbClr val="7A7A43"/>
-                </a:solidFill>
-              </a:rPr>
-              <a:t>get</a:t>
+              <a:t>            </a:t>
+            </a:r>
+            <a:r>
+              <a:rPr lang="en-US" sz="1600" dirty="0" smtClean="0"/>
+              <a:t>callback</a:t>
             </a:r>
             <a:r>
               <a:rPr lang="en-US" sz="1600" dirty="0"/>
               <a:t>( </a:t>
-            </a:r>
-            <a:r>
-              <a:rPr lang="en-US" sz="1600" b="1" dirty="0">
-                <a:solidFill>
-                  <a:srgbClr val="008000"/>
-                </a:solidFill>
-              </a:rPr>
-              <a:t>'/</a:t>
-            </a:r>
-            <a:r>
-              <a:rPr lang="en-US" sz="1600" b="1" dirty="0" err="1">
-                <a:solidFill>
-                  <a:srgbClr val="008000"/>
-                </a:solidFill>
-              </a:rPr>
-              <a:t>api</a:t>
-            </a:r>
-            <a:r>
-              <a:rPr lang="en-US" sz="1600" b="1" dirty="0">
-                <a:solidFill>
-                  <a:srgbClr val="008000"/>
-                </a:solidFill>
-              </a:rPr>
-              <a:t>/</a:t>
-            </a:r>
-            <a:r>
-              <a:rPr lang="en-US" sz="1600" b="1" dirty="0" err="1">
-                <a:solidFill>
-                  <a:srgbClr val="008000"/>
-                </a:solidFill>
-              </a:rPr>
-              <a:t>todos</a:t>
-            </a:r>
-            <a:r>
-              <a:rPr lang="en-US" sz="1600" b="1" dirty="0">
-                <a:solidFill>
-                  <a:srgbClr val="008000"/>
-                </a:solidFill>
-              </a:rPr>
-              <a:t>'</a:t>
-            </a:r>
-            <a:r>
-              <a:rPr lang="en-US" sz="1600" dirty="0"/>
-              <a:t>, </a:t>
-            </a:r>
-            <a:r>
-              <a:rPr lang="en-US" sz="1600" b="1" dirty="0">
-                <a:solidFill>
-                  <a:srgbClr val="000080"/>
-                </a:solidFill>
-              </a:rPr>
-              <a:t>function</a:t>
-            </a:r>
-            <a:r>
-              <a:rPr lang="en-US" sz="1600" dirty="0"/>
-              <a:t>( model ) {</a:t>
-            </a:r>
-            <a:br>
-              <a:rPr lang="en-US" sz="1600" dirty="0"/>
-            </a:br>
-            <a:r>
-              <a:rPr lang="en-US" sz="1600" dirty="0"/>
-              <a:t>            </a:t>
-            </a:r>
-            <a:r>
-              <a:rPr lang="en-US" sz="1600" b="1" i="1" dirty="0">
-                <a:solidFill>
-                  <a:srgbClr val="660E7A"/>
-                </a:solidFill>
-              </a:rPr>
-              <a:t>_</a:t>
-            </a:r>
-            <a:r>
-              <a:rPr lang="en-US" sz="1600" b="1" i="1" dirty="0" err="1">
-                <a:solidFill>
-                  <a:srgbClr val="660E7A"/>
-                </a:solidFill>
-              </a:rPr>
-              <a:t>csrf</a:t>
-            </a:r>
-            <a:r>
-              <a:rPr lang="en-US" sz="1600" b="1" i="1" dirty="0">
-                <a:solidFill>
-                  <a:srgbClr val="660E7A"/>
-                </a:solidFill>
-              </a:rPr>
-              <a:t> </a:t>
-            </a:r>
-            <a:r>
-              <a:rPr lang="en-US" sz="1600" dirty="0"/>
-              <a:t>= model.</a:t>
-            </a:r>
-            <a:r>
-              <a:rPr lang="en-US" sz="1600" b="1" dirty="0">
-                <a:solidFill>
-                  <a:srgbClr val="660E7A"/>
-                </a:solidFill>
-              </a:rPr>
-              <a:t>_</a:t>
-            </a:r>
-            <a:r>
-              <a:rPr lang="en-US" sz="1600" b="1" dirty="0" err="1">
-                <a:solidFill>
-                  <a:srgbClr val="660E7A"/>
-                </a:solidFill>
-              </a:rPr>
-              <a:t>csrf</a:t>
-            </a:r>
-            <a:r>
-              <a:rPr lang="en-US" sz="1600" dirty="0"/>
-              <a:t>;</a:t>
-            </a:r>
-            <a:br>
-              <a:rPr lang="en-US" sz="1600" dirty="0"/>
-            </a:br>
-            <a:r>
-              <a:rPr lang="en-US" sz="1600" dirty="0"/>
-              <a:t>            callback( </a:t>
             </a:r>
             <a:r>
               <a:rPr lang="en-US" sz="1600" dirty="0" err="1"/>
@@ -14830,111 +14663,11 @@
         <p:grpSpPr>
           <a:xfrm>
             <a:off x="2931577" y="2057400"/>
-            <a:ext cx="4957246" cy="3685033"/>
+            <a:ext cx="4807464" cy="3047816"/>
             <a:chOff x="2877427" y="1319505"/>
-            <a:chExt cx="4957246" cy="3685033"/>
+            <a:chExt cx="4807464" cy="3047816"/>
           </a:xfrm>
         </p:grpSpPr>
-        <p:grpSp>
-          <p:nvGrpSpPr>
-            <p:cNvPr id="14" name="Group 13"/>
-            <p:cNvGrpSpPr/>
-            <p:nvPr/>
-          </p:nvGrpSpPr>
-          <p:grpSpPr>
-            <a:xfrm>
-              <a:off x="3810000" y="2971800"/>
-              <a:ext cx="4024673" cy="484632"/>
-              <a:chOff x="2514600" y="1981200"/>
-              <a:chExt cx="4024673" cy="484632"/>
-            </a:xfrm>
-          </p:grpSpPr>
-          <p:sp>
-            <p:nvSpPr>
-              <p:cNvPr id="21" name="Down Arrow 20"/>
-              <p:cNvSpPr/>
-              <p:nvPr/>
-            </p:nvSpPr>
-            <p:spPr>
-              <a:xfrm rot="5400000">
-                <a:off x="2761488" y="1734312"/>
-                <a:ext cx="484632" cy="978408"/>
-              </a:xfrm>
-              <a:prstGeom prst="downArrow">
-                <a:avLst/>
-              </a:prstGeom>
-              <a:solidFill>
-                <a:srgbClr val="C00000"/>
-              </a:solidFill>
-              <a:ln>
-                <a:noFill/>
-              </a:ln>
-            </p:spPr>
-            <p:style>
-              <a:lnRef idx="2">
-                <a:schemeClr val="accent1">
-                  <a:shade val="50000"/>
-                </a:schemeClr>
-              </a:lnRef>
-              <a:fillRef idx="1">
-                <a:schemeClr val="accent1"/>
-              </a:fillRef>
-              <a:effectRef idx="0">
-                <a:schemeClr val="accent1"/>
-              </a:effectRef>
-              <a:fontRef idx="minor">
-                <a:schemeClr val="lt1"/>
-              </a:fontRef>
-            </p:style>
-            <p:txBody>
-              <a:bodyPr rot="0" spcFirstLastPara="0" vertOverflow="overflow" horzOverflow="overflow" vert="horz" wrap="square" lIns="0" tIns="0" rIns="0" bIns="0" numCol="1" spcCol="0" rtlCol="0" fromWordArt="0" anchor="ctr" anchorCtr="0" forceAA="0" compatLnSpc="1">
-                <a:prstTxWarp prst="textNoShape">
-                  <a:avLst/>
-                </a:prstTxWarp>
-                <a:noAutofit/>
-              </a:bodyPr>
-              <a:lstStyle/>
-              <a:p>
-                <a:pPr algn="ctr"/>
-                <a:endParaRPr lang="en-US" dirty="0" err="1" smtClean="0"/>
-              </a:p>
-            </p:txBody>
-          </p:sp>
-          <p:sp>
-            <p:nvSpPr>
-              <p:cNvPr id="22" name="TextBox 21"/>
-              <p:cNvSpPr txBox="1"/>
-              <p:nvPr/>
-            </p:nvSpPr>
-            <p:spPr>
-              <a:xfrm>
-                <a:off x="3594364" y="2085016"/>
-                <a:ext cx="2944909" cy="276999"/>
-              </a:xfrm>
-              <a:prstGeom prst="rect">
-                <a:avLst/>
-              </a:prstGeom>
-              <a:noFill/>
-            </p:spPr>
-            <p:txBody>
-              <a:bodyPr wrap="none" lIns="0" tIns="0" rIns="0" bIns="0" rtlCol="0">
-                <a:spAutoFit/>
-              </a:bodyPr>
-              <a:lstStyle/>
-              <a:p>
-                <a:pPr algn="ctr"/>
-                <a:r>
-                  <a:rPr lang="en-US" dirty="0" smtClean="0">
-                    <a:solidFill>
-                      <a:srgbClr val="FF0000"/>
-                    </a:solidFill>
-                  </a:rPr>
-                  <a:t>Keep track of the CSRF token</a:t>
-                </a:r>
-              </a:p>
-            </p:txBody>
-          </p:sp>
-        </p:grpSp>
         <p:grpSp>
           <p:nvGrpSpPr>
             <p:cNvPr id="15" name="Group 14"/>
@@ -14943,9 +14676,9 @@
           </p:nvGrpSpPr>
           <p:grpSpPr>
             <a:xfrm>
-              <a:off x="3779520" y="4519906"/>
+              <a:off x="3867770" y="3882689"/>
               <a:ext cx="3817121" cy="484632"/>
-              <a:chOff x="2514600" y="1981200"/>
+              <a:chOff x="2602850" y="1343983"/>
               <a:chExt cx="3817121" cy="484632"/>
             </a:xfrm>
           </p:grpSpPr>
@@ -14957,7 +14690,7 @@
             </p:nvSpPr>
             <p:spPr>
               <a:xfrm rot="5400000">
-                <a:off x="2761488" y="1734312"/>
+                <a:off x="2849738" y="1097095"/>
                 <a:ext cx="484632" cy="978408"/>
               </a:xfrm>
               <a:prstGeom prst="downArrow">
@@ -15008,7 +14741,7 @@
             </p:nvSpPr>
             <p:spPr>
               <a:xfrm>
-                <a:off x="3801926" y="2085016"/>
+                <a:off x="3890176" y="1447799"/>
                 <a:ext cx="2529795" cy="276999"/>
               </a:xfrm>
               <a:prstGeom prst="rect">
@@ -15152,7 +14885,7 @@
     </p:spTree>
     <p:extLst>
       <p:ext uri="{BB962C8B-B14F-4D97-AF65-F5344CB8AC3E}">
-        <p14:creationId xmlns:p14="http://schemas.microsoft.com/office/powerpoint/2010/main" val="1663109423"/>
+        <p14:creationId xmlns:p14="http://schemas.microsoft.com/office/powerpoint/2010/main" val="61172672"/>
       </p:ext>
     </p:extLst>
   </p:cSld>

</xml_diff>

<commit_message>
Removed the refernece to _csrf
</commit_message>
<xml_diff>
--- a/lesson-react-20-ajax/react-ajax.pptx
+++ b/lesson-react-20-ajax/react-ajax.pptx
@@ -1955,7 +1955,7 @@
           <a:noFill/>
           <a:extLst>
             <a:ext uri="{909E8E84-426E-40dd-AFC4-6F175D3DCCD1}">
-              <a14:hiddenFill xmlns="" xmlns:a14="http://schemas.microsoft.com/office/drawing/2010/main">
+              <a14:hiddenFill xmlns:a14="http://schemas.microsoft.com/office/drawing/2010/main" xmlns="">
                 <a:solidFill>
                   <a:srgbClr val="FFFFFF"/>
                 </a:solidFill>
@@ -10571,11 +10571,7 @@
             </a:pPr>
             <a:r>
               <a:rPr lang="en-US" dirty="0" smtClean="0"/>
-              <a:t>Watch i</a:t>
-            </a:r>
-            <a:r>
-              <a:rPr lang="en-US" dirty="0" smtClean="0"/>
-              <a:t>t work</a:t>
+              <a:t>Watch it work</a:t>
             </a:r>
             <a:r>
               <a:rPr lang="is-IS" dirty="0" smtClean="0"/>
@@ -12293,15 +12289,7 @@
             </a:pPr>
             <a:r>
               <a:rPr lang="en-US" dirty="0" smtClean="0"/>
-              <a:t>Client Side Frameworks c</a:t>
-            </a:r>
-            <a:r>
-              <a:rPr lang="en-US" dirty="0" smtClean="0"/>
-              <a:t>an’t </a:t>
-            </a:r>
-            <a:r>
-              <a:rPr lang="en-US" dirty="0" smtClean="0"/>
-              <a:t>run on the server</a:t>
+              <a:t>Client Side Frameworks can’t run on the server</a:t>
             </a:r>
           </a:p>
           <a:p>
@@ -12371,11 +12359,7 @@
             </a:pPr>
             <a:r>
               <a:rPr lang="en-US" dirty="0" smtClean="0"/>
-              <a:t>Errors </a:t>
-            </a:r>
-            <a:r>
-              <a:rPr lang="en-US" dirty="0" smtClean="0"/>
-              <a:t>encountered </a:t>
+              <a:t>Errors encountered </a:t>
             </a:r>
             <a:r>
               <a:rPr lang="mr-IN" dirty="0" smtClean="0"/>
@@ -12397,7 +12381,6 @@
               <a:rPr lang="en-US" dirty="0" smtClean="0"/>
               <a:t> object doesn’t exist on server</a:t>
             </a:r>
-            <a:endParaRPr lang="en-US" dirty="0" smtClean="0"/>
           </a:p>
           <a:p>
             <a:pPr marL="342900" indent="-342900">
@@ -12590,11 +12573,7 @@
             </a:r>
             <a:r>
               <a:rPr lang="en-US" dirty="0" smtClean="0"/>
-              <a:t> module </a:t>
-            </a:r>
-            <a:r>
-              <a:rPr lang="en-US" dirty="0" smtClean="0"/>
-              <a:t>– update the state at the end</a:t>
+              <a:t> module – update the state at the end</a:t>
             </a:r>
           </a:p>
           <a:p>
@@ -14333,55 +14312,19 @@
               <a:t>content</a:t>
             </a:r>
             <a:r>
-              <a:rPr lang="en-US" sz="1600" dirty="0"/>
-              <a:t>: content, </a:t>
-            </a:r>
-            <a:r>
-              <a:rPr lang="en-US" sz="1600" b="1" dirty="0">
-                <a:solidFill>
-                  <a:srgbClr val="660E7A"/>
-                </a:solidFill>
-              </a:rPr>
-              <a:t>_</a:t>
-            </a:r>
-            <a:r>
-              <a:rPr lang="en-US" sz="1600" b="1" dirty="0" err="1">
-                <a:solidFill>
-                  <a:srgbClr val="660E7A"/>
-                </a:solidFill>
-              </a:rPr>
-              <a:t>csrf</a:t>
-            </a:r>
-            <a:r>
-              <a:rPr lang="en-US" sz="1600" dirty="0"/>
+              <a:rPr lang="en-US" sz="1600"/>
               <a:t>: </a:t>
             </a:r>
             <a:r>
-              <a:rPr lang="en-US" sz="1600" b="1" i="1" dirty="0">
-                <a:solidFill>
-                  <a:srgbClr val="660E7A"/>
-                </a:solidFill>
-              </a:rPr>
-              <a:t>_</a:t>
-            </a:r>
-            <a:r>
-              <a:rPr lang="en-US" sz="1600" b="1" i="1" dirty="0" err="1">
-                <a:solidFill>
-                  <a:srgbClr val="660E7A"/>
-                </a:solidFill>
-              </a:rPr>
-              <a:t>csrf</a:t>
-            </a:r>
-            <a:r>
-              <a:rPr lang="en-US" sz="1600" b="1" i="1" dirty="0">
-                <a:solidFill>
-                  <a:srgbClr val="660E7A"/>
-                </a:solidFill>
-              </a:rPr>
+              <a:rPr lang="en-US" sz="1600" smtClean="0"/>
+              <a:t>content</a:t>
+            </a:r>
+            <a:r>
+              <a:rPr lang="en-US" sz="1600"/>
               <a:t> </a:t>
             </a:r>
             <a:r>
-              <a:rPr lang="en-US" sz="1600" dirty="0"/>
+              <a:rPr lang="en-US" sz="1600" smtClean="0"/>
               <a:t>}, </a:t>
             </a:r>
             <a:r>

</xml_diff>

<commit_message>
Changes from the teaching
</commit_message>
<xml_diff>
--- a/lesson-react-20-ajax/react-ajax.pptx
+++ b/lesson-react-20-ajax/react-ajax.pptx
@@ -14312,19 +14312,19 @@
               <a:t>content</a:t>
             </a:r>
             <a:r>
-              <a:rPr lang="en-US" sz="1600"/>
+              <a:rPr lang="en-US" sz="1600" dirty="0"/>
               <a:t>: </a:t>
             </a:r>
             <a:r>
-              <a:rPr lang="en-US" sz="1600" smtClean="0"/>
+              <a:rPr lang="en-US" sz="1600" dirty="0" smtClean="0"/>
               <a:t>content</a:t>
             </a:r>
             <a:r>
-              <a:rPr lang="en-US" sz="1600"/>
+              <a:rPr lang="en-US" sz="1600" dirty="0"/>
               <a:t> </a:t>
             </a:r>
             <a:r>
-              <a:rPr lang="en-US" sz="1600" smtClean="0"/>
+              <a:rPr lang="en-US" sz="1600" dirty="0" smtClean="0"/>
               <a:t>}, </a:t>
             </a:r>
             <a:r>

</xml_diff>